<commit_message>
set up on vscode
</commit_message>
<xml_diff>
--- a/praktikum/praesentation/praesentation.pptx
+++ b/praktikum/praesentation/praesentation.pptx
@@ -1,6 +1,6 @@
 
 <file path=ppt/presentation.xml><?xml version="1.0" encoding="utf-8"?>
-<p:presentation xmlns:a="http://schemas.openxmlformats.org/drawingml/2006/main" xmlns:p="http://schemas.openxmlformats.org/presentationml/2006/main" xmlns:r="http://schemas.openxmlformats.org/officeDocument/2006/relationships" autoCompressPictures="0" saveSubsetFonts="1">
+<p:presentation xmlns:a="http://schemas.openxmlformats.org/drawingml/2006/main" xmlns:r="http://schemas.openxmlformats.org/officeDocument/2006/relationships" xmlns:p="http://schemas.openxmlformats.org/presentationml/2006/main" saveSubsetFonts="1" autoCompressPictures="0">
   <p:sldMasterIdLst>
     <p:sldMasterId id="2147483648" r:id="rId1"/>
   </p:sldMasterIdLst>
@@ -22,8 +22,8 @@
     <a:defPPr>
       <a:defRPr lang="en-US"/>
     </a:defPPr>
-    <a:lvl1pPr algn="l" defTabSz="457200" eaLnBrk="1" hangingPunct="1" latinLnBrk="0" marL="0" rtl="0">
-      <a:defRPr kern="1200" sz="1800">
+    <a:lvl1pPr marL="0" algn="l" defTabSz="457200" rtl="0" eaLnBrk="1" latinLnBrk="0" hangingPunct="1">
+      <a:defRPr sz="1800" kern="1200">
         <a:solidFill>
           <a:schemeClr val="tx1"/>
         </a:solidFill>
@@ -32,8 +32,8 @@
         <a:cs typeface="+mn-cs"/>
       </a:defRPr>
     </a:lvl1pPr>
-    <a:lvl2pPr algn="l" defTabSz="457200" eaLnBrk="1" hangingPunct="1" latinLnBrk="0" marL="457200" rtl="0">
-      <a:defRPr kern="1200" sz="1800">
+    <a:lvl2pPr marL="457200" algn="l" defTabSz="457200" rtl="0" eaLnBrk="1" latinLnBrk="0" hangingPunct="1">
+      <a:defRPr sz="1800" kern="1200">
         <a:solidFill>
           <a:schemeClr val="tx1"/>
         </a:solidFill>
@@ -42,8 +42,8 @@
         <a:cs typeface="+mn-cs"/>
       </a:defRPr>
     </a:lvl2pPr>
-    <a:lvl3pPr algn="l" defTabSz="457200" eaLnBrk="1" hangingPunct="1" latinLnBrk="0" marL="914400" rtl="0">
-      <a:defRPr kern="1200" sz="1800">
+    <a:lvl3pPr marL="914400" algn="l" defTabSz="457200" rtl="0" eaLnBrk="1" latinLnBrk="0" hangingPunct="1">
+      <a:defRPr sz="1800" kern="1200">
         <a:solidFill>
           <a:schemeClr val="tx1"/>
         </a:solidFill>
@@ -52,8 +52,8 @@
         <a:cs typeface="+mn-cs"/>
       </a:defRPr>
     </a:lvl3pPr>
-    <a:lvl4pPr algn="l" defTabSz="457200" eaLnBrk="1" hangingPunct="1" latinLnBrk="0" marL="1371600" rtl="0">
-      <a:defRPr kern="1200" sz="1800">
+    <a:lvl4pPr marL="1371600" algn="l" defTabSz="457200" rtl="0" eaLnBrk="1" latinLnBrk="0" hangingPunct="1">
+      <a:defRPr sz="1800" kern="1200">
         <a:solidFill>
           <a:schemeClr val="tx1"/>
         </a:solidFill>
@@ -62,8 +62,8 @@
         <a:cs typeface="+mn-cs"/>
       </a:defRPr>
     </a:lvl4pPr>
-    <a:lvl5pPr algn="l" defTabSz="457200" eaLnBrk="1" hangingPunct="1" latinLnBrk="0" marL="1828800" rtl="0">
-      <a:defRPr kern="1200" sz="1800">
+    <a:lvl5pPr marL="1828800" algn="l" defTabSz="457200" rtl="0" eaLnBrk="1" latinLnBrk="0" hangingPunct="1">
+      <a:defRPr sz="1800" kern="1200">
         <a:solidFill>
           <a:schemeClr val="tx1"/>
         </a:solidFill>
@@ -72,8 +72,8 @@
         <a:cs typeface="+mn-cs"/>
       </a:defRPr>
     </a:lvl5pPr>
-    <a:lvl6pPr algn="l" defTabSz="457200" eaLnBrk="1" hangingPunct="1" latinLnBrk="0" marL="2286000" rtl="0">
-      <a:defRPr kern="1200" sz="1800">
+    <a:lvl6pPr marL="2286000" algn="l" defTabSz="457200" rtl="0" eaLnBrk="1" latinLnBrk="0" hangingPunct="1">
+      <a:defRPr sz="1800" kern="1200">
         <a:solidFill>
           <a:schemeClr val="tx1"/>
         </a:solidFill>
@@ -82,8 +82,8 @@
         <a:cs typeface="+mn-cs"/>
       </a:defRPr>
     </a:lvl6pPr>
-    <a:lvl7pPr algn="l" defTabSz="457200" eaLnBrk="1" hangingPunct="1" latinLnBrk="0" marL="2743200" rtl="0">
-      <a:defRPr kern="1200" sz="1800">
+    <a:lvl7pPr marL="2743200" algn="l" defTabSz="457200" rtl="0" eaLnBrk="1" latinLnBrk="0" hangingPunct="1">
+      <a:defRPr sz="1800" kern="1200">
         <a:solidFill>
           <a:schemeClr val="tx1"/>
         </a:solidFill>
@@ -92,8 +92,8 @@
         <a:cs typeface="+mn-cs"/>
       </a:defRPr>
     </a:lvl7pPr>
-    <a:lvl8pPr algn="l" defTabSz="457200" eaLnBrk="1" hangingPunct="1" latinLnBrk="0" marL="3200400" rtl="0">
-      <a:defRPr kern="1200" sz="1800">
+    <a:lvl8pPr marL="3200400" algn="l" defTabSz="457200" rtl="0" eaLnBrk="1" latinLnBrk="0" hangingPunct="1">
+      <a:defRPr sz="1800" kern="1200">
         <a:solidFill>
           <a:schemeClr val="tx1"/>
         </a:solidFill>
@@ -102,8 +102,8 @@
         <a:cs typeface="+mn-cs"/>
       </a:defRPr>
     </a:lvl8pPr>
-    <a:lvl9pPr algn="l" defTabSz="457200" eaLnBrk="1" hangingPunct="1" latinLnBrk="0" marL="3657600" rtl="0">
-      <a:defRPr kern="1200" sz="1800">
+    <a:lvl9pPr marL="3657600" algn="l" defTabSz="457200" rtl="0" eaLnBrk="1" latinLnBrk="0" hangingPunct="1">
+      <a:defRPr sz="1800" kern="1200">
         <a:solidFill>
           <a:schemeClr val="tx1"/>
         </a:solidFill>
@@ -313,7 +313,7 @@
           <a:p>
             <a:fld id="{241EB5C9-1307-BA42-ABA2-0BC069CD8E7F}" type="datetimeFigureOut">
               <a:rPr lang="en-US" smtClean="0"/>
-              <a:t>4/5/2019</a:t>
+              <a:t>2/17/2018</a:t>
             </a:fld>
             <a:endParaRPr lang="en-US"/>
           </a:p>
@@ -483,7 +483,7 @@
           <a:p>
             <a:fld id="{241EB5C9-1307-BA42-ABA2-0BC069CD8E7F}" type="datetimeFigureOut">
               <a:rPr lang="en-US" smtClean="0"/>
-              <a:t>4/5/2019</a:t>
+              <a:t>2/17/2018</a:t>
             </a:fld>
             <a:endParaRPr lang="en-US"/>
           </a:p>
@@ -663,7 +663,7 @@
           <a:p>
             <a:fld id="{241EB5C9-1307-BA42-ABA2-0BC069CD8E7F}" type="datetimeFigureOut">
               <a:rPr lang="en-US" smtClean="0"/>
-              <a:t>4/5/2019</a:t>
+              <a:t>2/17/2018</a:t>
             </a:fld>
             <a:endParaRPr lang="en-US"/>
           </a:p>
@@ -833,7 +833,7 @@
           <a:p>
             <a:fld id="{241EB5C9-1307-BA42-ABA2-0BC069CD8E7F}" type="datetimeFigureOut">
               <a:rPr lang="en-US" smtClean="0"/>
-              <a:t>4/5/2019</a:t>
+              <a:t>2/17/2018</a:t>
             </a:fld>
             <a:endParaRPr lang="en-US"/>
           </a:p>
@@ -1079,7 +1079,7 @@
           <a:p>
             <a:fld id="{241EB5C9-1307-BA42-ABA2-0BC069CD8E7F}" type="datetimeFigureOut">
               <a:rPr lang="en-US" smtClean="0"/>
-              <a:t>4/5/2019</a:t>
+              <a:t>2/17/2018</a:t>
             </a:fld>
             <a:endParaRPr lang="en-US"/>
           </a:p>
@@ -1367,7 +1367,7 @@
           <a:p>
             <a:fld id="{241EB5C9-1307-BA42-ABA2-0BC069CD8E7F}" type="datetimeFigureOut">
               <a:rPr lang="en-US" smtClean="0"/>
-              <a:t>4/5/2019</a:t>
+              <a:t>2/17/2018</a:t>
             </a:fld>
             <a:endParaRPr lang="en-US"/>
           </a:p>
@@ -1789,7 +1789,7 @@
           <a:p>
             <a:fld id="{241EB5C9-1307-BA42-ABA2-0BC069CD8E7F}" type="datetimeFigureOut">
               <a:rPr lang="en-US" smtClean="0"/>
-              <a:t>4/5/2019</a:t>
+              <a:t>2/17/2018</a:t>
             </a:fld>
             <a:endParaRPr lang="en-US"/>
           </a:p>
@@ -1907,7 +1907,7 @@
           <a:p>
             <a:fld id="{241EB5C9-1307-BA42-ABA2-0BC069CD8E7F}" type="datetimeFigureOut">
               <a:rPr lang="en-US" smtClean="0"/>
-              <a:t>4/5/2019</a:t>
+              <a:t>2/17/2018</a:t>
             </a:fld>
             <a:endParaRPr lang="en-US"/>
           </a:p>
@@ -2002,7 +2002,7 @@
           <a:p>
             <a:fld id="{241EB5C9-1307-BA42-ABA2-0BC069CD8E7F}" type="datetimeFigureOut">
               <a:rPr lang="en-US" smtClean="0"/>
-              <a:t>4/5/2019</a:t>
+              <a:t>2/17/2018</a:t>
             </a:fld>
             <a:endParaRPr lang="en-US"/>
           </a:p>
@@ -2279,7 +2279,7 @@
           <a:p>
             <a:fld id="{241EB5C9-1307-BA42-ABA2-0BC069CD8E7F}" type="datetimeFigureOut">
               <a:rPr lang="en-US" smtClean="0"/>
-              <a:t>4/5/2019</a:t>
+              <a:t>2/17/2018</a:t>
             </a:fld>
             <a:endParaRPr lang="en-US"/>
           </a:p>
@@ -2532,7 +2532,7 @@
           <a:p>
             <a:fld id="{241EB5C9-1307-BA42-ABA2-0BC069CD8E7F}" type="datetimeFigureOut">
               <a:rPr lang="en-US" smtClean="0"/>
-              <a:t>4/5/2019</a:t>
+              <a:t>2/17/2018</a:t>
             </a:fld>
             <a:endParaRPr lang="en-US"/>
           </a:p>
@@ -2745,7 +2745,7 @@
           <a:p>
             <a:fld id="{241EB5C9-1307-BA42-ABA2-0BC069CD8E7F}" type="datetimeFigureOut">
               <a:rPr lang="en-US" smtClean="0"/>
-              <a:t>4/5/2019</a:t>
+              <a:t>2/17/2018</a:t>
             </a:fld>
             <a:endParaRPr lang="en-US"/>
           </a:p>
@@ -3181,7 +3181,7 @@
             <a:spLocks noGrp="1"/>
           </p:cNvSpPr>
           <p:nvPr>
-            <p:ph idx="1" type="subTitle"/>
+            <p:ph type="subTitle" idx="1"/>
           </p:nvPr>
         </p:nvSpPr>
         <p:spPr>
@@ -3273,7 +3273,7 @@
             <a:spLocks noGrp="1"/>
           </p:cNvSpPr>
           <p:nvPr>
-            <p:ph idx="10" sz="half" type="dt"/>
+            <p:ph type="dt" sz="half" idx="10"/>
           </p:nvPr>
         </p:nvSpPr>
         <p:spPr/>
@@ -3716,21 +3716,48 @@
             <a:pPr lvl="1"/>
             <a:r>
               <a:rPr/>
-              <a:t>A</a:t>
+              <a:t>Anbieter von Aus- und Weiterbildungsdienstleistungen</a:t>
             </a:r>
           </a:p>
           <a:p>
             <a:pPr lvl="1"/>
             <a:r>
               <a:rPr/>
-              <a:t>B</a:t>
+              <a:t>Deutschlandweite 16 Schulungszentren</a:t>
             </a:r>
           </a:p>
           <a:p>
             <a:pPr lvl="1"/>
             <a:r>
               <a:rPr/>
-              <a:t>C</a:t>
+              <a:t>Offizieler Bildungspartner von u.a.:</a:t>
+            </a:r>
+          </a:p>
+          <a:p>
+            <a:pPr lvl="2">
+              <a:buAutoNum type="arabicPeriod"/>
+            </a:pPr>
+            <a:r>
+              <a:rPr/>
+              <a:t>Microsoft Corporation</a:t>
+            </a:r>
+          </a:p>
+          <a:p>
+            <a:pPr lvl="2">
+              <a:buAutoNum type="arabicPeriod"/>
+            </a:pPr>
+            <a:r>
+              <a:rPr/>
+              <a:t>DATEV Software &amp; Consulting</a:t>
+            </a:r>
+          </a:p>
+          <a:p>
+            <a:pPr lvl="2">
+              <a:buAutoNum type="arabicPeriod"/>
+            </a:pPr>
+            <a:r>
+              <a:rPr/>
+              <a:t>FSGU Akademie</a:t>
             </a:r>
           </a:p>
         </p:txBody>
@@ -3810,7 +3837,7 @@
             </a:pPr>
             <a:r>
               <a:rPr/>
-              <a:t>1</a:t>
+              <a:t>AVGS - Staatlich finanzierte Arbeitsvermittlung und/oder Arbeitserhaltungsmaßnahmen</a:t>
             </a:r>
           </a:p>
           <a:p>
@@ -3819,7 +3846,7 @@
             </a:pPr>
             <a:r>
               <a:rPr/>
-              <a:t>2</a:t>
+              <a:t>Berufliche Rehabilitation, insbesondere als Träger für die deutsche Rentenversicherung</a:t>
             </a:r>
           </a:p>
           <a:p>
@@ -3828,7 +3855,7 @@
             </a:pPr>
             <a:r>
               <a:rPr/>
-              <a:t>3</a:t>
+              <a:t>Berufsbegleitende Weiterbildungen im Rahmen der Personalentwicklung(“near the job”)</a:t>
             </a:r>
           </a:p>
         </p:txBody>

</xml_diff>